<commit_message>
Final Version before Dry run
</commit_message>
<xml_diff>
--- a/Microservices_Template.pptx
+++ b/Microservices_Template.pptx
@@ -6,10 +6,10 @@
     <p:sldMasterId id="2147483730" r:id="rId5"/>
   </p:sldMasterIdLst>
   <p:notesMasterIdLst>
-    <p:notesMasterId r:id="rId33"/>
+    <p:notesMasterId r:id="rId36"/>
   </p:notesMasterIdLst>
   <p:handoutMasterIdLst>
-    <p:handoutMasterId r:id="rId34"/>
+    <p:handoutMasterId r:id="rId37"/>
   </p:handoutMasterIdLst>
   <p:sldIdLst>
     <p:sldId id="452" r:id="rId6"/>
@@ -37,8 +37,11 @@
     <p:sldId id="480" r:id="rId28"/>
     <p:sldId id="478" r:id="rId29"/>
     <p:sldId id="479" r:id="rId30"/>
-    <p:sldId id="481" r:id="rId31"/>
-    <p:sldId id="482" r:id="rId32"/>
+    <p:sldId id="483" r:id="rId31"/>
+    <p:sldId id="484" r:id="rId32"/>
+    <p:sldId id="485" r:id="rId33"/>
+    <p:sldId id="481" r:id="rId34"/>
+    <p:sldId id="482" r:id="rId35"/>
   </p:sldIdLst>
   <p:sldSz cx="9144000" cy="6858000" type="screen4x3"/>
   <p:notesSz cx="6858000" cy="9144000"/>
@@ -330,7 +333,7 @@
           <a:p>
             <a:fld id="{7F5E9BF7-95E4-A242-BA1D-05FDCF603BE6}" type="datetime1">
               <a:rPr lang="en-US" smtClean="0"/>
-              <a:t>10/21/2015</a:t>
+              <a:t>10/22/2015</a:t>
             </a:fld>
             <a:endParaRPr lang="en-US"/>
           </a:p>
@@ -496,7 +499,7 @@
           <a:p>
             <a:fld id="{165DBCB1-0306-AD41-9452-11E7C08D5C04}" type="datetime1">
               <a:rPr lang="en-US" smtClean="0"/>
-              <a:t>10/21/2015</a:t>
+              <a:t>10/22/2015</a:t>
             </a:fld>
             <a:endParaRPr lang="en-US"/>
           </a:p>
@@ -3439,6 +3442,592 @@
     <p:extLst>
       <p:ext uri="{BB962C8B-B14F-4D97-AF65-F5344CB8AC3E}">
         <p14:creationId xmlns:p14="http://schemas.microsoft.com/office/powerpoint/2010/main" val="2860688175"/>
+      </p:ext>
+    </p:extLst>
+  </p:cSld>
+  <p:clrMapOvr>
+    <a:masterClrMapping/>
+  </p:clrMapOvr>
+</p:notes>
+</file>
+
+<file path=ppt/notesSlides/notesSlide26.xml><?xml version="1.0" encoding="utf-8"?>
+<p:notes xmlns:a="http://schemas.openxmlformats.org/drawingml/2006/main" xmlns:r="http://schemas.openxmlformats.org/officeDocument/2006/relationships" xmlns:p="http://schemas.openxmlformats.org/presentationml/2006/main">
+  <p:cSld>
+    <p:spTree>
+      <p:nvGrpSpPr>
+        <p:cNvPr id="1" name=""/>
+        <p:cNvGrpSpPr/>
+        <p:nvPr/>
+      </p:nvGrpSpPr>
+      <p:grpSpPr>
+        <a:xfrm>
+          <a:off x="0" y="0"/>
+          <a:ext cx="0" cy="0"/>
+          <a:chOff x="0" y="0"/>
+          <a:chExt cx="0" cy="0"/>
+        </a:xfrm>
+      </p:grpSpPr>
+      <p:sp>
+        <p:nvSpPr>
+          <p:cNvPr id="2" name="Образ слайда 1"/>
+          <p:cNvSpPr>
+            <a:spLocks noGrp="1" noRot="1" noChangeAspect="1"/>
+          </p:cNvSpPr>
+          <p:nvPr>
+            <p:ph type="sldImg"/>
+          </p:nvPr>
+        </p:nvSpPr>
+        <p:spPr/>
+      </p:sp>
+      <p:sp>
+        <p:nvSpPr>
+          <p:cNvPr id="3" name="Заметки 2"/>
+          <p:cNvSpPr>
+            <a:spLocks noGrp="1"/>
+          </p:cNvSpPr>
+          <p:nvPr>
+            <p:ph type="body" idx="1"/>
+          </p:nvPr>
+        </p:nvSpPr>
+        <p:spPr/>
+        <p:txBody>
+          <a:bodyPr/>
+          <a:lstStyle/>
+          <a:p>
+            <a:pPr marL="171450" marR="0" indent="-171450" algn="l" defTabSz="457200" rtl="0" eaLnBrk="1" fontAlgn="auto" latinLnBrk="0" hangingPunct="1">
+              <a:lnSpc>
+                <a:spcPct val="100000"/>
+              </a:lnSpc>
+              <a:spcBef>
+                <a:spcPts val="0"/>
+              </a:spcBef>
+              <a:spcAft>
+                <a:spcPts val="0"/>
+              </a:spcAft>
+              <a:buClrTx/>
+              <a:buSzTx/>
+              <a:buFontTx/>
+              <a:buChar char="-"/>
+              <a:tabLst/>
+              <a:defRPr/>
+            </a:pPr>
+            <a:r>
+              <a:rPr lang="ru-RU" sz="1200" dirty="0" smtClean="0">
+                <a:solidFill>
+                  <a:srgbClr val="444444"/>
+                </a:solidFill>
+                <a:latin typeface="Trebuchet MS"/>
+                <a:cs typeface="Trebuchet MS"/>
+              </a:rPr>
+              <a:t>Система достаточно понятна</a:t>
+            </a:r>
+          </a:p>
+          <a:p>
+            <a:pPr marL="628650" marR="0" lvl="1" indent="-171450" algn="l" defTabSz="457200" rtl="0" eaLnBrk="1" fontAlgn="auto" latinLnBrk="0" hangingPunct="1">
+              <a:lnSpc>
+                <a:spcPct val="100000"/>
+              </a:lnSpc>
+              <a:spcBef>
+                <a:spcPts val="0"/>
+              </a:spcBef>
+              <a:spcAft>
+                <a:spcPts val="0"/>
+              </a:spcAft>
+              <a:buClrTx/>
+              <a:buSzTx/>
+              <a:buFontTx/>
+              <a:buChar char="-"/>
+              <a:tabLst/>
+              <a:defRPr/>
+            </a:pPr>
+            <a:r>
+              <a:rPr lang="ru-RU" sz="1200" dirty="0" smtClean="0">
+                <a:solidFill>
+                  <a:srgbClr val="444444"/>
+                </a:solidFill>
+                <a:latin typeface="Trebuchet MS"/>
+                <a:cs typeface="Trebuchet MS"/>
+              </a:rPr>
+              <a:t>Если</a:t>
+            </a:r>
+            <a:r>
+              <a:rPr lang="ru-RU" sz="1200" baseline="0" dirty="0" smtClean="0">
+                <a:solidFill>
+                  <a:srgbClr val="444444"/>
+                </a:solidFill>
+                <a:latin typeface="Trebuchet MS"/>
+                <a:cs typeface="Trebuchet MS"/>
+              </a:rPr>
+              <a:t> вы можете ответить на вопрос, как реализован тот или иной функционал и не возникает вопроса «Что </a:t>
+            </a:r>
+            <a:r>
+              <a:rPr lang="ru-RU" sz="1200" baseline="0" smtClean="0">
+                <a:solidFill>
+                  <a:srgbClr val="444444"/>
+                </a:solidFill>
+                <a:latin typeface="Trebuchet MS"/>
+                <a:cs typeface="Trebuchet MS"/>
+              </a:rPr>
+              <a:t>здесь происходит?»</a:t>
+            </a:r>
+            <a:endParaRPr lang="en-US" sz="1200" dirty="0" smtClean="0">
+              <a:solidFill>
+                <a:srgbClr val="444444"/>
+              </a:solidFill>
+              <a:latin typeface="Trebuchet MS"/>
+              <a:cs typeface="Trebuchet MS"/>
+            </a:endParaRPr>
+          </a:p>
+          <a:p>
+            <a:pPr marL="171450" indent="-171450">
+              <a:buFontTx/>
+              <a:buChar char="-"/>
+            </a:pPr>
+            <a:r>
+              <a:rPr lang="ru-RU" sz="1200" dirty="0" smtClean="0">
+                <a:solidFill>
+                  <a:srgbClr val="444444"/>
+                </a:solidFill>
+                <a:latin typeface="Trebuchet MS"/>
+                <a:cs typeface="Trebuchet MS"/>
+              </a:rPr>
+              <a:t>Система </a:t>
+            </a:r>
+            <a:r>
+              <a:rPr lang="ru-RU" sz="1200" dirty="0" smtClean="0">
+                <a:solidFill>
+                  <a:srgbClr val="444444"/>
+                </a:solidFill>
+                <a:latin typeface="Trebuchet MS"/>
+                <a:cs typeface="Trebuchet MS"/>
+              </a:rPr>
+              <a:t>достаточно размыта</a:t>
+            </a:r>
+          </a:p>
+          <a:p>
+            <a:pPr marL="628650" lvl="1" indent="-171450">
+              <a:buFontTx/>
+              <a:buChar char="-"/>
+            </a:pPr>
+            <a:r>
+              <a:rPr lang="ru-RU" dirty="0" smtClean="0">
+                <a:solidFill>
+                  <a:srgbClr val="444444"/>
+                </a:solidFill>
+                <a:latin typeface="Trebuchet MS"/>
+              </a:rPr>
+              <a:t>Когда сложно</a:t>
+            </a:r>
+            <a:r>
+              <a:rPr lang="ru-RU" baseline="0" dirty="0" smtClean="0">
+                <a:solidFill>
+                  <a:srgbClr val="444444"/>
+                </a:solidFill>
+                <a:latin typeface="Trebuchet MS"/>
+              </a:rPr>
+              <a:t> разбить систему на слабо связанные сервисы с ограниченными доменными областями</a:t>
+            </a:r>
+            <a:endParaRPr lang="ru-RU" dirty="0"/>
+          </a:p>
+        </p:txBody>
+      </p:sp>
+      <p:sp>
+        <p:nvSpPr>
+          <p:cNvPr id="4" name="Номер слайда 3"/>
+          <p:cNvSpPr>
+            <a:spLocks noGrp="1"/>
+          </p:cNvSpPr>
+          <p:nvPr>
+            <p:ph type="sldNum" sz="quarter" idx="10"/>
+          </p:nvPr>
+        </p:nvSpPr>
+        <p:spPr/>
+        <p:txBody>
+          <a:bodyPr/>
+          <a:lstStyle/>
+          <a:p>
+            <a:fld id="{7AE90029-A909-AD4E-9775-A0D64990AD22}" type="slidenum">
+              <a:rPr lang="en-US" smtClean="0"/>
+              <a:t>26</a:t>
+            </a:fld>
+            <a:endParaRPr lang="en-US"/>
+          </a:p>
+        </p:txBody>
+      </p:sp>
+    </p:spTree>
+    <p:extLst>
+      <p:ext uri="{BB962C8B-B14F-4D97-AF65-F5344CB8AC3E}">
+        <p14:creationId xmlns:p14="http://schemas.microsoft.com/office/powerpoint/2010/main" val="1939072022"/>
+      </p:ext>
+    </p:extLst>
+  </p:cSld>
+  <p:clrMapOvr>
+    <a:masterClrMapping/>
+  </p:clrMapOvr>
+</p:notes>
+</file>
+
+<file path=ppt/notesSlides/notesSlide27.xml><?xml version="1.0" encoding="utf-8"?>
+<p:notes xmlns:a="http://schemas.openxmlformats.org/drawingml/2006/main" xmlns:r="http://schemas.openxmlformats.org/officeDocument/2006/relationships" xmlns:p="http://schemas.openxmlformats.org/presentationml/2006/main">
+  <p:cSld>
+    <p:spTree>
+      <p:nvGrpSpPr>
+        <p:cNvPr id="1" name=""/>
+        <p:cNvGrpSpPr/>
+        <p:nvPr/>
+      </p:nvGrpSpPr>
+      <p:grpSpPr>
+        <a:xfrm>
+          <a:off x="0" y="0"/>
+          <a:ext cx="0" cy="0"/>
+          <a:chOff x="0" y="0"/>
+          <a:chExt cx="0" cy="0"/>
+        </a:xfrm>
+      </p:grpSpPr>
+      <p:sp>
+        <p:nvSpPr>
+          <p:cNvPr id="2" name="Образ слайда 1"/>
+          <p:cNvSpPr>
+            <a:spLocks noGrp="1" noRot="1" noChangeAspect="1"/>
+          </p:cNvSpPr>
+          <p:nvPr>
+            <p:ph type="sldImg"/>
+          </p:nvPr>
+        </p:nvSpPr>
+        <p:spPr/>
+      </p:sp>
+      <p:sp>
+        <p:nvSpPr>
+          <p:cNvPr id="3" name="Заметки 2"/>
+          <p:cNvSpPr>
+            <a:spLocks noGrp="1"/>
+          </p:cNvSpPr>
+          <p:nvPr>
+            <p:ph type="body" idx="1"/>
+          </p:nvPr>
+        </p:nvSpPr>
+        <p:spPr/>
+        <p:txBody>
+          <a:bodyPr/>
+          <a:lstStyle/>
+          <a:p>
+            <a:pPr marL="171450" indent="-171450">
+              <a:buFontTx/>
+              <a:buChar char="-"/>
+            </a:pPr>
+            <a:r>
+              <a:rPr lang="ru-RU" dirty="0" smtClean="0"/>
+              <a:t>Система чересчур большая </a:t>
+            </a:r>
+          </a:p>
+          <a:p>
+            <a:pPr marL="628650" lvl="1" indent="-171450">
+              <a:buFontTx/>
+              <a:buChar char="-"/>
+            </a:pPr>
+            <a:r>
+              <a:rPr lang="ru-RU" dirty="0" smtClean="0"/>
+              <a:t>просто не помещается на одном сервере</a:t>
+            </a:r>
+          </a:p>
+          <a:p>
+            <a:pPr marL="171450" lvl="0" indent="-171450">
+              <a:buFontTx/>
+              <a:buChar char="-"/>
+            </a:pPr>
+            <a:r>
+              <a:rPr lang="ru-RU" dirty="0" smtClean="0"/>
+              <a:t>Команда</a:t>
+            </a:r>
+            <a:r>
+              <a:rPr lang="ru-RU" baseline="0" dirty="0" smtClean="0"/>
+              <a:t> чересчур большая</a:t>
+            </a:r>
+          </a:p>
+          <a:p>
+            <a:pPr marL="628650" lvl="1" indent="-171450">
+              <a:buFontTx/>
+              <a:buChar char="-"/>
+            </a:pPr>
+            <a:r>
+              <a:rPr lang="ru-RU" baseline="0" dirty="0" smtClean="0"/>
+              <a:t>И распределенная</a:t>
+            </a:r>
+            <a:endParaRPr lang="ru-RU" dirty="0" smtClean="0"/>
+          </a:p>
+          <a:p>
+            <a:pPr marL="171450" indent="-171450">
+              <a:buFontTx/>
+              <a:buChar char="-"/>
+            </a:pPr>
+            <a:r>
+              <a:rPr lang="ru-RU" dirty="0" smtClean="0"/>
+              <a:t>Система чересчур сложная</a:t>
+            </a:r>
+          </a:p>
+          <a:p>
+            <a:pPr marL="628650" lvl="1" indent="-171450">
+              <a:buFontTx/>
+              <a:buChar char="-"/>
+            </a:pPr>
+            <a:r>
+              <a:rPr lang="ru-RU" dirty="0" smtClean="0"/>
+              <a:t>Сложная в понимании</a:t>
+            </a:r>
+          </a:p>
+          <a:p>
+            <a:pPr marL="628650" lvl="1" indent="-171450">
+              <a:buFontTx/>
+              <a:buChar char="-"/>
+            </a:pPr>
+            <a:r>
+              <a:rPr lang="ru-RU" dirty="0" smtClean="0"/>
+              <a:t>Сложная в разработке</a:t>
+            </a:r>
+          </a:p>
+          <a:p>
+            <a:pPr marL="628650" lvl="1" indent="-171450">
+              <a:buFontTx/>
+              <a:buChar char="-"/>
+            </a:pPr>
+            <a:r>
+              <a:rPr lang="ru-RU" dirty="0" smtClean="0"/>
+              <a:t>Сложная в развертывании</a:t>
+            </a:r>
+          </a:p>
+          <a:p>
+            <a:pPr marL="171450" lvl="0" indent="-171450">
+              <a:buFontTx/>
+              <a:buChar char="-"/>
+            </a:pPr>
+            <a:r>
+              <a:rPr lang="ru-RU" dirty="0" smtClean="0"/>
+              <a:t>Система</a:t>
+            </a:r>
+            <a:r>
+              <a:rPr lang="ru-RU" baseline="0" dirty="0" smtClean="0"/>
+              <a:t> слишком новая</a:t>
+            </a:r>
+          </a:p>
+          <a:p>
+            <a:pPr marL="628650" lvl="1" indent="-171450">
+              <a:buFontTx/>
+              <a:buChar char="-"/>
+            </a:pPr>
+            <a:r>
+              <a:rPr lang="ru-RU" baseline="0" dirty="0" smtClean="0"/>
+              <a:t>Изолировать </a:t>
+            </a:r>
+            <a:r>
+              <a:rPr lang="ru-RU" baseline="0" dirty="0" err="1" smtClean="0"/>
+              <a:t>легаси</a:t>
+            </a:r>
+            <a:r>
+              <a:rPr lang="ru-RU" baseline="0" dirty="0" smtClean="0"/>
+              <a:t> приложения</a:t>
+            </a:r>
+            <a:endParaRPr lang="ru-RU" dirty="0"/>
+          </a:p>
+        </p:txBody>
+      </p:sp>
+      <p:sp>
+        <p:nvSpPr>
+          <p:cNvPr id="4" name="Номер слайда 3"/>
+          <p:cNvSpPr>
+            <a:spLocks noGrp="1"/>
+          </p:cNvSpPr>
+          <p:nvPr>
+            <p:ph type="sldNum" sz="quarter" idx="10"/>
+          </p:nvPr>
+        </p:nvSpPr>
+        <p:spPr/>
+        <p:txBody>
+          <a:bodyPr/>
+          <a:lstStyle/>
+          <a:p>
+            <a:fld id="{7AE90029-A909-AD4E-9775-A0D64990AD22}" type="slidenum">
+              <a:rPr lang="en-US" smtClean="0"/>
+              <a:t>27</a:t>
+            </a:fld>
+            <a:endParaRPr lang="en-US"/>
+          </a:p>
+        </p:txBody>
+      </p:sp>
+    </p:spTree>
+    <p:extLst>
+      <p:ext uri="{BB962C8B-B14F-4D97-AF65-F5344CB8AC3E}">
+        <p14:creationId xmlns:p14="http://schemas.microsoft.com/office/powerpoint/2010/main" val="1939072022"/>
+      </p:ext>
+    </p:extLst>
+  </p:cSld>
+  <p:clrMapOvr>
+    <a:masterClrMapping/>
+  </p:clrMapOvr>
+</p:notes>
+</file>
+
+<file path=ppt/notesSlides/notesSlide28.xml><?xml version="1.0" encoding="utf-8"?>
+<p:notes xmlns:a="http://schemas.openxmlformats.org/drawingml/2006/main" xmlns:r="http://schemas.openxmlformats.org/officeDocument/2006/relationships" xmlns:p="http://schemas.openxmlformats.org/presentationml/2006/main">
+  <p:cSld>
+    <p:spTree>
+      <p:nvGrpSpPr>
+        <p:cNvPr id="1" name=""/>
+        <p:cNvGrpSpPr/>
+        <p:nvPr/>
+      </p:nvGrpSpPr>
+      <p:grpSpPr>
+        <a:xfrm>
+          <a:off x="0" y="0"/>
+          <a:ext cx="0" cy="0"/>
+          <a:chOff x="0" y="0"/>
+          <a:chExt cx="0" cy="0"/>
+        </a:xfrm>
+      </p:grpSpPr>
+      <p:sp>
+        <p:nvSpPr>
+          <p:cNvPr id="2" name="Образ слайда 1"/>
+          <p:cNvSpPr>
+            <a:spLocks noGrp="1" noRot="1" noChangeAspect="1"/>
+          </p:cNvSpPr>
+          <p:nvPr>
+            <p:ph type="sldImg"/>
+          </p:nvPr>
+        </p:nvSpPr>
+        <p:spPr/>
+      </p:sp>
+      <p:sp>
+        <p:nvSpPr>
+          <p:cNvPr id="3" name="Заметки 2"/>
+          <p:cNvSpPr>
+            <a:spLocks noGrp="1"/>
+          </p:cNvSpPr>
+          <p:nvPr>
+            <p:ph type="body" idx="1"/>
+          </p:nvPr>
+        </p:nvSpPr>
+        <p:spPr/>
+        <p:txBody>
+          <a:bodyPr/>
+          <a:lstStyle/>
+          <a:p>
+            <a:r>
+              <a:rPr lang="ru-RU" dirty="0" smtClean="0"/>
+              <a:t>Упрощают понимание – за счет</a:t>
+            </a:r>
+            <a:r>
+              <a:rPr lang="ru-RU" baseline="0" dirty="0" smtClean="0"/>
+              <a:t> необходимости разбиения системы на слабосвязанные сервисы</a:t>
+            </a:r>
+          </a:p>
+          <a:p>
+            <a:pPr marL="0" marR="0" lvl="1" indent="0" algn="l" defTabSz="457200" rtl="0" eaLnBrk="1" fontAlgn="auto" latinLnBrk="0" hangingPunct="1">
+              <a:lnSpc>
+                <a:spcPct val="100000"/>
+              </a:lnSpc>
+              <a:spcBef>
+                <a:spcPts val="0"/>
+              </a:spcBef>
+              <a:spcAft>
+                <a:spcPts val="0"/>
+              </a:spcAft>
+              <a:buClrTx/>
+              <a:buSzTx/>
+              <a:buFontTx/>
+              <a:buNone/>
+              <a:tabLst/>
+              <a:defRPr/>
+            </a:pPr>
+            <a:r>
+              <a:rPr lang="ru-RU" dirty="0" smtClean="0"/>
+              <a:t>Упрощают масштабирование – за</a:t>
+            </a:r>
+            <a:r>
+              <a:rPr lang="ru-RU" baseline="0" dirty="0" smtClean="0"/>
+              <a:t> счет возможности создания множества серверов с развернутыми </a:t>
+            </a:r>
+            <a:r>
+              <a:rPr lang="ru-RU" baseline="0" dirty="0" err="1" smtClean="0"/>
+              <a:t>микросервисами</a:t>
+            </a:r>
+            <a:endParaRPr lang="ru-RU" baseline="0" dirty="0" smtClean="0"/>
+          </a:p>
+          <a:p>
+            <a:pPr marL="0" marR="0" lvl="1" indent="0" algn="l" defTabSz="457200" rtl="0" eaLnBrk="1" fontAlgn="auto" latinLnBrk="0" hangingPunct="1">
+              <a:lnSpc>
+                <a:spcPct val="100000"/>
+              </a:lnSpc>
+              <a:spcBef>
+                <a:spcPts val="0"/>
+              </a:spcBef>
+              <a:spcAft>
+                <a:spcPts val="0"/>
+              </a:spcAft>
+              <a:buClrTx/>
+              <a:buSzTx/>
+              <a:buFontTx/>
+              <a:buNone/>
+              <a:tabLst/>
+              <a:defRPr/>
+            </a:pPr>
+            <a:r>
+              <a:rPr lang="en-US" dirty="0" smtClean="0"/>
+              <a:t>Right Tool For Right Tool</a:t>
+            </a:r>
+            <a:endParaRPr lang="ru-RU" smtClean="0"/>
+          </a:p>
+          <a:p>
+            <a:pPr marL="0" marR="0" lvl="1" indent="0" algn="l" defTabSz="457200" rtl="0" eaLnBrk="1" fontAlgn="auto" latinLnBrk="0" hangingPunct="1">
+              <a:lnSpc>
+                <a:spcPct val="100000"/>
+              </a:lnSpc>
+              <a:spcBef>
+                <a:spcPts val="0"/>
+              </a:spcBef>
+              <a:spcAft>
+                <a:spcPts val="0"/>
+              </a:spcAft>
+              <a:buClrTx/>
+              <a:buSzTx/>
+              <a:buFontTx/>
+              <a:buNone/>
+              <a:tabLst/>
+              <a:defRPr/>
+            </a:pPr>
+            <a:endParaRPr lang="ru-RU" baseline="0" dirty="0" smtClean="0"/>
+          </a:p>
+          <a:p>
+            <a:endParaRPr lang="ru-RU" dirty="0"/>
+          </a:p>
+        </p:txBody>
+      </p:sp>
+      <p:sp>
+        <p:nvSpPr>
+          <p:cNvPr id="4" name="Номер слайда 3"/>
+          <p:cNvSpPr>
+            <a:spLocks noGrp="1"/>
+          </p:cNvSpPr>
+          <p:nvPr>
+            <p:ph type="sldNum" sz="quarter" idx="10"/>
+          </p:nvPr>
+        </p:nvSpPr>
+        <p:spPr/>
+        <p:txBody>
+          <a:bodyPr/>
+          <a:lstStyle/>
+          <a:p>
+            <a:fld id="{7AE90029-A909-AD4E-9775-A0D64990AD22}" type="slidenum">
+              <a:rPr lang="en-US" smtClean="0"/>
+              <a:t>28</a:t>
+            </a:fld>
+            <a:endParaRPr lang="en-US"/>
+          </a:p>
+        </p:txBody>
+      </p:sp>
+    </p:spTree>
+    <p:extLst>
+      <p:ext uri="{BB962C8B-B14F-4D97-AF65-F5344CB8AC3E}">
+        <p14:creationId xmlns:p14="http://schemas.microsoft.com/office/powerpoint/2010/main" val="4199199565"/>
       </p:ext>
     </p:extLst>
   </p:cSld>
@@ -17136,19 +17725,12 @@
   <p:cSld>
     <p:bg>
       <p:bgPr>
-        <a:pattFill prst="pct40">
-          <a:fgClr>
-            <a:schemeClr val="accent1">
-              <a:lumMod val="50000"/>
-            </a:schemeClr>
-          </a:fgClr>
-          <a:bgClr>
-            <a:schemeClr val="accent5">
-              <a:lumMod val="60000"/>
-              <a:lumOff val="40000"/>
-            </a:schemeClr>
-          </a:bgClr>
-        </a:pattFill>
+        <a:solidFill>
+          <a:schemeClr val="accent5">
+            <a:lumMod val="60000"/>
+            <a:lumOff val="40000"/>
+          </a:schemeClr>
+        </a:solidFill>
         <a:effectLst/>
       </p:bgPr>
     </p:bg>
@@ -17372,7 +17954,7 @@
         <p:spPr>
           <a:xfrm>
             <a:off x="457200" y="1204686"/>
-            <a:ext cx="8229600" cy="4921477"/>
+            <a:ext cx="8229600" cy="5208814"/>
           </a:xfrm>
         </p:spPr>
         <p:txBody>
@@ -17397,67 +17979,67 @@
           <a:p>
             <a:pPr lvl="1"/>
             <a:r>
+              <a:rPr lang="en-US" sz="3200" b="1" dirty="0" smtClean="0"/>
+              <a:t>Continuous Integration</a:t>
+            </a:r>
+          </a:p>
+          <a:p>
+            <a:pPr lvl="2"/>
+            <a:r>
+              <a:rPr lang="en-US" sz="2400" dirty="0" smtClean="0"/>
+              <a:t>Jenkins</a:t>
+            </a:r>
+          </a:p>
+          <a:p>
+            <a:pPr lvl="2"/>
+            <a:r>
+              <a:rPr lang="ru-RU" sz="2400" dirty="0" smtClean="0"/>
+              <a:t>Выделенное окружение разработчика</a:t>
+            </a:r>
+            <a:endParaRPr lang="en-US" sz="2400" dirty="0" smtClean="0"/>
+          </a:p>
+          <a:p>
+            <a:pPr lvl="1"/>
+            <a:r>
               <a:rPr lang="en-US" sz="2800" b="1" dirty="0" smtClean="0"/>
-              <a:t>Continuous Integration</a:t>
-            </a:r>
+              <a:t>One-button Deployment</a:t>
+            </a:r>
+          </a:p>
+          <a:p>
+            <a:pPr lvl="1"/>
+            <a:r>
+              <a:rPr lang="en-US" sz="2800" b="1" dirty="0" smtClean="0"/>
+              <a:t>Database Evolution</a:t>
+            </a:r>
+            <a:endParaRPr lang="ru-RU" sz="2800" b="1" dirty="0" smtClean="0"/>
           </a:p>
           <a:p>
             <a:pPr lvl="2"/>
             <a:r>
-              <a:rPr lang="en-US" sz="2000" dirty="0" smtClean="0"/>
-              <a:t>Jenkins</a:t>
-            </a:r>
+              <a:rPr lang="ru-RU" sz="2400" dirty="0" smtClean="0"/>
+              <a:t>Создание структур БД</a:t>
+            </a:r>
+            <a:endParaRPr lang="en-US" sz="2400" dirty="0" smtClean="0"/>
           </a:p>
           <a:p>
             <a:pPr lvl="2"/>
             <a:r>
-              <a:rPr lang="ru-RU" sz="2000" dirty="0" smtClean="0"/>
-              <a:t>Выделенное окружение разработчика</a:t>
-            </a:r>
-            <a:endParaRPr lang="en-US" sz="2000" dirty="0" smtClean="0"/>
+              <a:rPr lang="ru-RU" sz="2400" dirty="0" smtClean="0"/>
+              <a:t>Миграция данных</a:t>
+            </a:r>
+          </a:p>
+          <a:p>
+            <a:pPr lvl="2"/>
+            <a:r>
+              <a:rPr lang="ru-RU" sz="2400" dirty="0" smtClean="0"/>
+              <a:t>Автоматическое выполнение</a:t>
+            </a:r>
+            <a:endParaRPr lang="en-US" sz="2400" dirty="0" smtClean="0"/>
           </a:p>
           <a:p>
             <a:pPr lvl="1"/>
             <a:r>
-              <a:rPr lang="en-US" sz="2400" b="1" dirty="0" smtClean="0"/>
-              <a:t>One-button Deployment</a:t>
-            </a:r>
-          </a:p>
-          <a:p>
-            <a:pPr lvl="1"/>
-            <a:r>
-              <a:rPr lang="en-US" sz="2400" b="1" dirty="0" smtClean="0"/>
-              <a:t>Database Evolution</a:t>
-            </a:r>
-            <a:endParaRPr lang="ru-RU" sz="2400" b="1" dirty="0" smtClean="0"/>
-          </a:p>
-          <a:p>
-            <a:pPr lvl="2"/>
-            <a:r>
-              <a:rPr lang="ru-RU" sz="2000" dirty="0" smtClean="0"/>
-              <a:t>Создание структур БД</a:t>
-            </a:r>
-            <a:endParaRPr lang="en-US" sz="2000" dirty="0" smtClean="0"/>
-          </a:p>
-          <a:p>
-            <a:pPr lvl="2"/>
-            <a:r>
-              <a:rPr lang="ru-RU" sz="2000" dirty="0" smtClean="0"/>
-              <a:t>Миграция данных</a:t>
-            </a:r>
-          </a:p>
-          <a:p>
-            <a:pPr lvl="2"/>
-            <a:r>
-              <a:rPr lang="ru-RU" sz="2000" dirty="0" smtClean="0"/>
-              <a:t>Автоматическое выполнение</a:t>
-            </a:r>
-            <a:endParaRPr lang="en-US" sz="2000" dirty="0" smtClean="0"/>
-          </a:p>
-          <a:p>
-            <a:pPr lvl="1"/>
-            <a:r>
-              <a:rPr lang="en-US" sz="2400" b="1" dirty="0" smtClean="0"/>
+              <a:rPr lang="en-US" sz="2800" b="1" dirty="0" smtClean="0"/>
               <a:t>Chef</a:t>
             </a:r>
           </a:p>
@@ -20077,7 +20659,6 @@
               <a:rPr lang="ru-RU" sz="3000" dirty="0" smtClean="0"/>
               <a:t>Ручное</a:t>
             </a:r>
-            <a:endParaRPr lang="ru-RU" sz="3000" dirty="0" smtClean="0"/>
           </a:p>
           <a:p>
             <a:pPr lvl="2"/>
@@ -22337,11 +22918,11 @@
   <p:clrMapOvr>
     <a:masterClrMapping/>
   </p:clrMapOvr>
-  <mc:AlternateContent xmlns:mc="http://schemas.openxmlformats.org/markup-compatibility/2006">
-    <mc:Choice xmlns:p14="http://schemas.microsoft.com/office/powerpoint/2010/main" Requires="p14">
+  <mc:AlternateContent xmlns:mc="http://schemas.openxmlformats.org/markup-compatibility/2006" xmlns:p14="http://schemas.microsoft.com/office/powerpoint/2010/main">
+    <mc:Choice Requires="p14">
       <p:transition spd="slow" p14:dur="2000"/>
     </mc:Choice>
-    <mc:Fallback>
+    <mc:Fallback xmlns="">
       <p:transition spd="slow"/>
     </mc:Fallback>
   </mc:AlternateContent>
@@ -22447,6 +23028,13 @@
   <p:clrMapOvr>
     <a:masterClrMapping/>
   </p:clrMapOvr>
+  <p:timing>
+    <p:tnLst>
+      <p:par>
+        <p:cTn id="1" dur="indefinite" restart="never" nodeType="tmRoot"/>
+      </p:par>
+    </p:tnLst>
+  </p:timing>
 </p:sld>
 </file>
 
@@ -24229,29 +24817,104 @@
             <p:ph type="body" sz="quarter" idx="10"/>
           </p:nvPr>
         </p:nvSpPr>
-        <p:spPr>
-          <a:xfrm>
-            <a:off x="2222500" y="2082800"/>
-            <a:ext cx="4165600" cy="1739900"/>
-          </a:xfrm>
-        </p:spPr>
+        <p:spPr/>
         <p:txBody>
           <a:bodyPr/>
           <a:lstStyle/>
           <a:p>
             <a:pPr algn="ctr"/>
             <a:r>
-              <a:rPr lang="en-US" dirty="0" smtClean="0"/>
-              <a:t>Q&amp;A   </a:t>
+              <a:rPr lang="ru-RU" dirty="0" smtClean="0"/>
+              <a:t>Когда использовать монолиты?</a:t>
             </a:r>
             <a:endParaRPr lang="ru-RU" dirty="0"/>
+          </a:p>
+        </p:txBody>
+      </p:sp>
+      <p:sp>
+        <p:nvSpPr>
+          <p:cNvPr id="5" name="TextBox 4"/>
+          <p:cNvSpPr txBox="1"/>
+          <p:nvPr/>
+        </p:nvSpPr>
+        <p:spPr>
+          <a:xfrm>
+            <a:off x="342900" y="1188168"/>
+            <a:ext cx="8394700" cy="2308324"/>
+          </a:xfrm>
+          <a:prstGeom prst="rect">
+            <a:avLst/>
+          </a:prstGeom>
+          <a:noFill/>
+        </p:spPr>
+        <p:txBody>
+          <a:bodyPr wrap="square" rtlCol="0">
+            <a:spAutoFit/>
+          </a:bodyPr>
+          <a:lstStyle/>
+          <a:p>
+            <a:pPr marL="571500" indent="-571500">
+              <a:lnSpc>
+                <a:spcPct val="120000"/>
+              </a:lnSpc>
+              <a:buFont typeface="Arial" pitchFamily="34" charset="0"/>
+              <a:buChar char="•"/>
+            </a:pPr>
+            <a:r>
+              <a:rPr lang="ru-RU" sz="4000" dirty="0" smtClean="0">
+                <a:solidFill>
+                  <a:srgbClr val="444444"/>
+                </a:solidFill>
+                <a:latin typeface="Trebuchet MS"/>
+                <a:cs typeface="Trebuchet MS"/>
+              </a:rPr>
+              <a:t>Первая версия</a:t>
+            </a:r>
+          </a:p>
+          <a:p>
+            <a:pPr marL="571500" indent="-571500">
+              <a:lnSpc>
+                <a:spcPct val="120000"/>
+              </a:lnSpc>
+              <a:buFont typeface="Arial" pitchFamily="34" charset="0"/>
+              <a:buChar char="•"/>
+            </a:pPr>
+            <a:r>
+              <a:rPr lang="ru-RU" sz="4000" dirty="0" smtClean="0">
+                <a:solidFill>
+                  <a:srgbClr val="444444"/>
+                </a:solidFill>
+                <a:latin typeface="Trebuchet MS"/>
+                <a:cs typeface="Trebuchet MS"/>
+              </a:rPr>
+              <a:t>Система достаточно понятна</a:t>
+            </a:r>
+          </a:p>
+          <a:p>
+            <a:pPr marL="571500" indent="-571500">
+              <a:lnSpc>
+                <a:spcPct val="120000"/>
+              </a:lnSpc>
+              <a:buFont typeface="Arial" pitchFamily="34" charset="0"/>
+              <a:buChar char="•"/>
+            </a:pPr>
+            <a:r>
+              <a:rPr lang="ru-RU" sz="4000" dirty="0" smtClean="0">
+                <a:solidFill>
+                  <a:srgbClr val="444444"/>
+                </a:solidFill>
+                <a:latin typeface="Trebuchet MS"/>
+                <a:cs typeface="Trebuchet MS"/>
+              </a:rPr>
+              <a:t>Система достаточно размыта</a:t>
+            </a:r>
           </a:p>
         </p:txBody>
       </p:sp>
     </p:spTree>
     <p:extLst>
       <p:ext uri="{BB962C8B-B14F-4D97-AF65-F5344CB8AC3E}">
-        <p14:creationId xmlns:p14="http://schemas.microsoft.com/office/powerpoint/2010/main" val="3965024869"/>
+        <p14:creationId xmlns:p14="http://schemas.microsoft.com/office/powerpoint/2010/main" val="1151815659"/>
       </p:ext>
     </p:extLst>
   </p:cSld>
@@ -24288,12 +24951,7 @@
             <p:ph type="body" sz="quarter" idx="10"/>
           </p:nvPr>
         </p:nvSpPr>
-        <p:spPr>
-          <a:xfrm>
-            <a:off x="0" y="2730500"/>
-            <a:ext cx="9144000" cy="932688"/>
-          </a:xfrm>
-        </p:spPr>
+        <p:spPr/>
         <p:txBody>
           <a:bodyPr/>
           <a:lstStyle/>
@@ -24301,22 +24959,310 @@
             <a:pPr algn="ctr"/>
             <a:r>
               <a:rPr lang="ru-RU" dirty="0" smtClean="0"/>
-              <a:t>Спасибо за внимание</a:t>
+              <a:t>Когда использовать </a:t>
+            </a:r>
+            <a:r>
+              <a:rPr lang="ru-RU" dirty="0" err="1" smtClean="0"/>
+              <a:t>микросервисы</a:t>
+            </a:r>
+            <a:r>
+              <a:rPr lang="ru-RU" dirty="0" smtClean="0"/>
+              <a:t>?</a:t>
             </a:r>
             <a:endParaRPr lang="ru-RU" dirty="0"/>
+          </a:p>
+        </p:txBody>
+      </p:sp>
+      <p:sp>
+        <p:nvSpPr>
+          <p:cNvPr id="5" name="TextBox 4"/>
+          <p:cNvSpPr txBox="1"/>
+          <p:nvPr/>
+        </p:nvSpPr>
+        <p:spPr>
+          <a:xfrm>
+            <a:off x="342900" y="1188168"/>
+            <a:ext cx="8394700" cy="3046988"/>
+          </a:xfrm>
+          <a:prstGeom prst="rect">
+            <a:avLst/>
+          </a:prstGeom>
+          <a:noFill/>
+        </p:spPr>
+        <p:txBody>
+          <a:bodyPr wrap="square" rtlCol="0">
+            <a:spAutoFit/>
+          </a:bodyPr>
+          <a:lstStyle/>
+          <a:p>
+            <a:pPr marL="571500" indent="-571500">
+              <a:lnSpc>
+                <a:spcPct val="120000"/>
+              </a:lnSpc>
+              <a:buFont typeface="Arial" pitchFamily="34" charset="0"/>
+              <a:buChar char="•"/>
+            </a:pPr>
+            <a:r>
+              <a:rPr lang="ru-RU" sz="4000" dirty="0" smtClean="0">
+                <a:solidFill>
+                  <a:srgbClr val="444444"/>
+                </a:solidFill>
+                <a:latin typeface="Trebuchet MS"/>
+                <a:cs typeface="Trebuchet MS"/>
+              </a:rPr>
+              <a:t>Система слишком большая</a:t>
+            </a:r>
+          </a:p>
+          <a:p>
+            <a:pPr marL="571500" indent="-571500">
+              <a:lnSpc>
+                <a:spcPct val="120000"/>
+              </a:lnSpc>
+              <a:buFont typeface="Arial" pitchFamily="34" charset="0"/>
+              <a:buChar char="•"/>
+            </a:pPr>
+            <a:r>
+              <a:rPr lang="ru-RU" sz="4000" dirty="0" smtClean="0">
+                <a:solidFill>
+                  <a:srgbClr val="444444"/>
+                </a:solidFill>
+                <a:latin typeface="Trebuchet MS"/>
+                <a:cs typeface="Trebuchet MS"/>
+              </a:rPr>
+              <a:t>Команда слишком большая</a:t>
+            </a:r>
+          </a:p>
+          <a:p>
+            <a:pPr marL="571500" indent="-571500">
+              <a:lnSpc>
+                <a:spcPct val="120000"/>
+              </a:lnSpc>
+              <a:buFont typeface="Arial" pitchFamily="34" charset="0"/>
+              <a:buChar char="•"/>
+            </a:pPr>
+            <a:r>
+              <a:rPr lang="ru-RU" sz="4000" dirty="0" smtClean="0">
+                <a:solidFill>
+                  <a:srgbClr val="444444"/>
+                </a:solidFill>
+                <a:latin typeface="Trebuchet MS"/>
+                <a:cs typeface="Trebuchet MS"/>
+              </a:rPr>
+              <a:t>Система слишком сложная</a:t>
+            </a:r>
+          </a:p>
+          <a:p>
+            <a:pPr marL="571500" indent="-571500">
+              <a:lnSpc>
+                <a:spcPct val="120000"/>
+              </a:lnSpc>
+              <a:buFont typeface="Arial" pitchFamily="34" charset="0"/>
+              <a:buChar char="•"/>
+            </a:pPr>
+            <a:r>
+              <a:rPr lang="ru-RU" sz="4000" dirty="0" smtClean="0">
+                <a:solidFill>
+                  <a:srgbClr val="444444"/>
+                </a:solidFill>
+                <a:latin typeface="Trebuchet MS"/>
+                <a:cs typeface="Trebuchet MS"/>
+              </a:rPr>
+              <a:t>Система слишком новая</a:t>
+            </a:r>
           </a:p>
         </p:txBody>
       </p:sp>
     </p:spTree>
     <p:extLst>
       <p:ext uri="{BB962C8B-B14F-4D97-AF65-F5344CB8AC3E}">
-        <p14:creationId xmlns:p14="http://schemas.microsoft.com/office/powerpoint/2010/main" val="4215061883"/>
+        <p14:creationId xmlns:p14="http://schemas.microsoft.com/office/powerpoint/2010/main" val="2782563885"/>
       </p:ext>
     </p:extLst>
   </p:cSld>
   <p:clrMapOvr>
     <a:masterClrMapping/>
   </p:clrMapOvr>
+</p:sld>
+</file>
+
+<file path=ppt/slides/slide28.xml><?xml version="1.0" encoding="utf-8"?>
+<p:sld xmlns:a="http://schemas.openxmlformats.org/drawingml/2006/main" xmlns:r="http://schemas.openxmlformats.org/officeDocument/2006/relationships" xmlns:p="http://schemas.openxmlformats.org/presentationml/2006/main">
+  <p:cSld>
+    <p:spTree>
+      <p:nvGrpSpPr>
+        <p:cNvPr id="1" name=""/>
+        <p:cNvGrpSpPr/>
+        <p:nvPr/>
+      </p:nvGrpSpPr>
+      <p:grpSpPr>
+        <a:xfrm>
+          <a:off x="0" y="0"/>
+          <a:ext cx="0" cy="0"/>
+          <a:chOff x="0" y="0"/>
+          <a:chExt cx="0" cy="0"/>
+        </a:xfrm>
+      </p:grpSpPr>
+      <p:sp>
+        <p:nvSpPr>
+          <p:cNvPr id="3" name="Объект 2"/>
+          <p:cNvSpPr>
+            <a:spLocks noGrp="1"/>
+          </p:cNvSpPr>
+          <p:nvPr>
+            <p:ph idx="1"/>
+          </p:nvPr>
+        </p:nvSpPr>
+        <p:spPr>
+          <a:xfrm>
+            <a:off x="360362" y="1439862"/>
+            <a:ext cx="8237537" cy="4572000"/>
+          </a:xfrm>
+        </p:spPr>
+        <p:txBody>
+          <a:bodyPr/>
+          <a:lstStyle/>
+          <a:p>
+            <a:r>
+              <a:rPr lang="ru-RU" sz="3200" dirty="0" err="1" smtClean="0"/>
+              <a:t>Микросервисы</a:t>
+            </a:r>
+            <a:endParaRPr lang="ru-RU" sz="3200" dirty="0" smtClean="0"/>
+          </a:p>
+          <a:p>
+            <a:pPr lvl="1"/>
+            <a:r>
+              <a:rPr lang="ru-RU" sz="3200" dirty="0" smtClean="0"/>
+              <a:t>Не серебряная пуля</a:t>
+            </a:r>
+          </a:p>
+          <a:p>
+            <a:pPr lvl="1"/>
+            <a:r>
+              <a:rPr lang="ru-RU" sz="3200" dirty="0" smtClean="0"/>
+              <a:t>Упрощают понимание</a:t>
+            </a:r>
+          </a:p>
+          <a:p>
+            <a:pPr lvl="1"/>
+            <a:r>
+              <a:rPr lang="ru-RU" sz="3200" dirty="0" smtClean="0"/>
+              <a:t>Упрощают масштабирование</a:t>
+            </a:r>
+            <a:endParaRPr lang="en-US" sz="3200" dirty="0" smtClean="0"/>
+          </a:p>
+          <a:p>
+            <a:pPr lvl="1"/>
+            <a:r>
+              <a:rPr lang="ru-RU" sz="3200" dirty="0" smtClean="0"/>
+              <a:t>Нужный инструмент для каждой цели</a:t>
+            </a:r>
+          </a:p>
+          <a:p>
+            <a:pPr lvl="1"/>
+            <a:endParaRPr lang="ru-RU" dirty="0"/>
+          </a:p>
+        </p:txBody>
+      </p:sp>
+      <p:sp>
+        <p:nvSpPr>
+          <p:cNvPr id="4" name="Текст 3"/>
+          <p:cNvSpPr>
+            <a:spLocks noGrp="1"/>
+          </p:cNvSpPr>
+          <p:nvPr>
+            <p:ph type="body" sz="quarter" idx="10"/>
+          </p:nvPr>
+        </p:nvSpPr>
+        <p:spPr/>
+        <p:txBody>
+          <a:bodyPr/>
+          <a:lstStyle/>
+          <a:p>
+            <a:pPr algn="ctr"/>
+            <a:r>
+              <a:rPr lang="ru-RU" dirty="0" smtClean="0"/>
+              <a:t>ВЫВОДЫ</a:t>
+            </a:r>
+            <a:endParaRPr lang="ru-RU" dirty="0"/>
+          </a:p>
+        </p:txBody>
+      </p:sp>
+    </p:spTree>
+    <p:extLst>
+      <p:ext uri="{BB962C8B-B14F-4D97-AF65-F5344CB8AC3E}">
+        <p14:creationId xmlns:p14="http://schemas.microsoft.com/office/powerpoint/2010/main" val="2288470798"/>
+      </p:ext>
+    </p:extLst>
+  </p:cSld>
+  <p:clrMapOvr>
+    <a:masterClrMapping/>
+  </p:clrMapOvr>
+</p:sld>
+</file>
+
+<file path=ppt/slides/slide29.xml><?xml version="1.0" encoding="utf-8"?>
+<p:sld xmlns:a="http://schemas.openxmlformats.org/drawingml/2006/main" xmlns:r="http://schemas.openxmlformats.org/officeDocument/2006/relationships" xmlns:p="http://schemas.openxmlformats.org/presentationml/2006/main">
+  <p:cSld>
+    <p:spTree>
+      <p:nvGrpSpPr>
+        <p:cNvPr id="1" name=""/>
+        <p:cNvGrpSpPr/>
+        <p:nvPr/>
+      </p:nvGrpSpPr>
+      <p:grpSpPr>
+        <a:xfrm>
+          <a:off x="0" y="0"/>
+          <a:ext cx="0" cy="0"/>
+          <a:chOff x="0" y="0"/>
+          <a:chExt cx="0" cy="0"/>
+        </a:xfrm>
+      </p:grpSpPr>
+      <p:sp>
+        <p:nvSpPr>
+          <p:cNvPr id="4" name="Текст 3"/>
+          <p:cNvSpPr>
+            <a:spLocks noGrp="1"/>
+          </p:cNvSpPr>
+          <p:nvPr>
+            <p:ph type="body" sz="quarter" idx="10"/>
+          </p:nvPr>
+        </p:nvSpPr>
+        <p:spPr>
+          <a:xfrm>
+            <a:off x="2222500" y="2082800"/>
+            <a:ext cx="4165600" cy="1739900"/>
+          </a:xfrm>
+        </p:spPr>
+        <p:txBody>
+          <a:bodyPr/>
+          <a:lstStyle/>
+          <a:p>
+            <a:pPr algn="ctr"/>
+            <a:r>
+              <a:rPr lang="en-US" dirty="0" smtClean="0"/>
+              <a:t>Q&amp;A   </a:t>
+            </a:r>
+            <a:endParaRPr lang="ru-RU" dirty="0"/>
+          </a:p>
+        </p:txBody>
+      </p:sp>
+    </p:spTree>
+    <p:extLst>
+      <p:ext uri="{BB962C8B-B14F-4D97-AF65-F5344CB8AC3E}">
+        <p14:creationId xmlns:p14="http://schemas.microsoft.com/office/powerpoint/2010/main" val="3965024869"/>
+      </p:ext>
+    </p:extLst>
+  </p:cSld>
+  <p:clrMapOvr>
+    <a:masterClrMapping/>
+  </p:clrMapOvr>
+  <p:timing>
+    <p:tnLst>
+      <p:par>
+        <p:cTn id="1" dur="indefinite" restart="never" nodeType="tmRoot"/>
+      </p:par>
+    </p:tnLst>
+  </p:timing>
 </p:sld>
 </file>
 
@@ -24696,6 +25642,72 @@
     <p:extLst>
       <p:ext uri="{BB962C8B-B14F-4D97-AF65-F5344CB8AC3E}">
         <p14:creationId xmlns:p14="http://schemas.microsoft.com/office/powerpoint/2010/main" val="1504602637"/>
+      </p:ext>
+    </p:extLst>
+  </p:cSld>
+  <p:clrMapOvr>
+    <a:masterClrMapping/>
+  </p:clrMapOvr>
+  <p:timing>
+    <p:tnLst>
+      <p:par>
+        <p:cTn id="1" dur="indefinite" restart="never" nodeType="tmRoot"/>
+      </p:par>
+    </p:tnLst>
+  </p:timing>
+</p:sld>
+</file>
+
+<file path=ppt/slides/slide30.xml><?xml version="1.0" encoding="utf-8"?>
+<p:sld xmlns:a="http://schemas.openxmlformats.org/drawingml/2006/main" xmlns:r="http://schemas.openxmlformats.org/officeDocument/2006/relationships" xmlns:p="http://schemas.openxmlformats.org/presentationml/2006/main">
+  <p:cSld>
+    <p:spTree>
+      <p:nvGrpSpPr>
+        <p:cNvPr id="1" name=""/>
+        <p:cNvGrpSpPr/>
+        <p:nvPr/>
+      </p:nvGrpSpPr>
+      <p:grpSpPr>
+        <a:xfrm>
+          <a:off x="0" y="0"/>
+          <a:ext cx="0" cy="0"/>
+          <a:chOff x="0" y="0"/>
+          <a:chExt cx="0" cy="0"/>
+        </a:xfrm>
+      </p:grpSpPr>
+      <p:sp>
+        <p:nvSpPr>
+          <p:cNvPr id="4" name="Текст 3"/>
+          <p:cNvSpPr>
+            <a:spLocks noGrp="1"/>
+          </p:cNvSpPr>
+          <p:nvPr>
+            <p:ph type="body" sz="quarter" idx="10"/>
+          </p:nvPr>
+        </p:nvSpPr>
+        <p:spPr>
+          <a:xfrm>
+            <a:off x="0" y="2730500"/>
+            <a:ext cx="9144000" cy="932688"/>
+          </a:xfrm>
+        </p:spPr>
+        <p:txBody>
+          <a:bodyPr/>
+          <a:lstStyle/>
+          <a:p>
+            <a:pPr algn="ctr"/>
+            <a:r>
+              <a:rPr lang="ru-RU" dirty="0" smtClean="0"/>
+              <a:t>Спасибо за внимание</a:t>
+            </a:r>
+            <a:endParaRPr lang="ru-RU" dirty="0"/>
+          </a:p>
+        </p:txBody>
+      </p:sp>
+    </p:spTree>
+    <p:extLst>
+      <p:ext uri="{BB962C8B-B14F-4D97-AF65-F5344CB8AC3E}">
+        <p14:creationId xmlns:p14="http://schemas.microsoft.com/office/powerpoint/2010/main" val="4215061883"/>
       </p:ext>
     </p:extLst>
   </p:cSld>
@@ -27074,11 +28086,7 @@
             </a:r>
             <a:r>
               <a:rPr lang="ru-RU" sz="2800" dirty="0" smtClean="0"/>
-              <a:t> Практики </a:t>
-            </a:r>
-            <a:r>
-              <a:rPr lang="en-US" sz="2800" dirty="0" err="1"/>
-              <a:t>DevOps</a:t>
+              <a:t> Нужно автоматизировать</a:t>
             </a:r>
             <a:endParaRPr lang="en-US" sz="2800" dirty="0"/>
           </a:p>
@@ -27207,8 +28215,19 @@
               <a:buNone/>
             </a:pPr>
             <a:r>
+              <a:rPr lang="en-US" sz="3200" dirty="0" smtClean="0">
+                <a:solidFill>
+                  <a:schemeClr val="accent2">
+                    <a:lumMod val="60000"/>
+                    <a:lumOff val="40000"/>
+                  </a:schemeClr>
+                </a:solidFill>
+              </a:rPr>
+              <a:t>-</a:t>
+            </a:r>
+            <a:r>
               <a:rPr lang="en-US" sz="3200" dirty="0" smtClean="0"/>
-              <a:t>- </a:t>
+              <a:t> </a:t>
             </a:r>
             <a:r>
               <a:rPr lang="ru-RU" sz="3200" dirty="0" smtClean="0"/>
@@ -27520,12 +28539,22 @@
             </a:lvl9pPr>
           </a:lstStyle>
           <a:p>
+            <a:pPr>
+              <a:lnSpc>
+                <a:spcPct val="200000"/>
+              </a:lnSpc>
+            </a:pPr>
             <a:r>
               <a:rPr lang="ru-RU" sz="2800" b="1" dirty="0" smtClean="0"/>
               <a:t>Абстрагироваться от инфраструктуры</a:t>
             </a:r>
           </a:p>
           <a:p>
+            <a:pPr>
+              <a:lnSpc>
+                <a:spcPct val="200000"/>
+              </a:lnSpc>
+            </a:pPr>
             <a:r>
               <a:rPr lang="ru-RU" sz="2800" b="1" dirty="0" smtClean="0"/>
               <a:t>Выровнять инфраструктуру окружений</a:t>
@@ -27533,7 +28562,11 @@
             <a:endParaRPr lang="en-US" sz="2800" b="1" dirty="0" smtClean="0"/>
           </a:p>
           <a:p>
-            <a:pPr lvl="1"/>
+            <a:pPr lvl="1">
+              <a:lnSpc>
+                <a:spcPct val="200000"/>
+              </a:lnSpc>
+            </a:pPr>
             <a:r>
               <a:rPr lang="ru-RU" sz="2400" dirty="0" smtClean="0"/>
               <a:t>Отдельные окружения (</a:t>
@@ -27542,12 +28575,14 @@
               <a:rPr lang="en-US" sz="2400" dirty="0" smtClean="0"/>
               <a:t>DEV/QA/PS/PROD)</a:t>
             </a:r>
-          </a:p>
-          <a:p>
-            <a:pPr lvl="1"/>
             <a:endParaRPr lang="ru-RU" sz="2400" dirty="0" smtClean="0"/>
           </a:p>
           <a:p>
+            <a:pPr>
+              <a:lnSpc>
+                <a:spcPct val="200000"/>
+              </a:lnSpc>
+            </a:pPr>
             <a:r>
               <a:rPr lang="ru-RU" sz="2800" b="1" dirty="0" smtClean="0"/>
               <a:t>Автоматизация</a:t>

</xml_diff>